<commit_message>
Addet pdf version of the presentation. Updated readme-file with valuable hints.
</commit_message>
<xml_diff>
--- a/nvdb2FME_jajens.pptx
+++ b/nvdb2FME_jajens.pptx
@@ -236,7 +236,7 @@
           <a:p>
             <a:fld id="{CF67E730-6CC1-4AA5-8873-2D45A47C3459}" type="datetimeFigureOut">
               <a:rPr lang="nb-NO" smtClean="0"/>
-              <a:t>05.05.2014</a:t>
+              <a:t>06.05.2014</a:t>
             </a:fld>
             <a:endParaRPr lang="nb-NO"/>
           </a:p>
@@ -1246,7 +1246,7 @@
           <a:p>
             <a:fld id="{62CCA688-0196-4668-938E-5AB69FE9DEDA}" type="datetimeFigureOut">
               <a:rPr lang="nb-NO" smtClean="0"/>
-              <a:t>05.05.2014</a:t>
+              <a:t>06.05.2014</a:t>
             </a:fld>
             <a:endParaRPr lang="nb-NO"/>
           </a:p>
@@ -1446,7 +1446,7 @@
           <a:p>
             <a:fld id="{62CCA688-0196-4668-938E-5AB69FE9DEDA}" type="datetimeFigureOut">
               <a:rPr lang="nb-NO" smtClean="0"/>
-              <a:t>05.05.2014</a:t>
+              <a:t>06.05.2014</a:t>
             </a:fld>
             <a:endParaRPr lang="nb-NO"/>
           </a:p>
@@ -1877,7 +1877,7 @@
           <a:p>
             <a:fld id="{62CCA688-0196-4668-938E-5AB69FE9DEDA}" type="datetimeFigureOut">
               <a:rPr lang="nb-NO" smtClean="0"/>
-              <a:t>05.05.2014</a:t>
+              <a:t>06.05.2014</a:t>
             </a:fld>
             <a:endParaRPr lang="nb-NO"/>
           </a:p>
@@ -2213,7 +2213,7 @@
           <a:p>
             <a:fld id="{62CCA688-0196-4668-938E-5AB69FE9DEDA}" type="datetimeFigureOut">
               <a:rPr lang="nb-NO" smtClean="0"/>
-              <a:t>05.05.2014</a:t>
+              <a:t>06.05.2014</a:t>
             </a:fld>
             <a:endParaRPr lang="nb-NO"/>
           </a:p>
@@ -2749,7 +2749,7 @@
           <a:p>
             <a:fld id="{62CCA688-0196-4668-938E-5AB69FE9DEDA}" type="datetimeFigureOut">
               <a:rPr lang="nb-NO" smtClean="0"/>
-              <a:t>05.05.2014</a:t>
+              <a:t>06.05.2014</a:t>
             </a:fld>
             <a:endParaRPr lang="nb-NO"/>
           </a:p>
@@ -3039,7 +3039,7 @@
           <a:p>
             <a:fld id="{62CCA688-0196-4668-938E-5AB69FE9DEDA}" type="datetimeFigureOut">
               <a:rPr lang="nb-NO" smtClean="0"/>
-              <a:t>05.05.2014</a:t>
+              <a:t>06.05.2014</a:t>
             </a:fld>
             <a:endParaRPr lang="nb-NO"/>
           </a:p>
@@ -3423,7 +3423,7 @@
           <a:p>
             <a:fld id="{62CCA688-0196-4668-938E-5AB69FE9DEDA}" type="datetimeFigureOut">
               <a:rPr lang="nb-NO" smtClean="0"/>
-              <a:t>05.05.2014</a:t>
+              <a:t>06.05.2014</a:t>
             </a:fld>
             <a:endParaRPr lang="nb-NO"/>
           </a:p>
@@ -3788,7 +3788,7 @@
           <a:p>
             <a:fld id="{62CCA688-0196-4668-938E-5AB69FE9DEDA}" type="datetimeFigureOut">
               <a:rPr lang="nb-NO" smtClean="0"/>
-              <a:t>05.05.2014</a:t>
+              <a:t>06.05.2014</a:t>
             </a:fld>
             <a:endParaRPr lang="nb-NO"/>
           </a:p>
@@ -4088,7 +4088,7 @@
           <a:p>
             <a:fld id="{62CCA688-0196-4668-938E-5AB69FE9DEDA}" type="datetimeFigureOut">
               <a:rPr lang="nb-NO" smtClean="0"/>
-              <a:t>05.05.2014</a:t>
+              <a:t>06.05.2014</a:t>
             </a:fld>
             <a:endParaRPr lang="nb-NO"/>
           </a:p>
@@ -4331,7 +4331,7 @@
           <a:p>
             <a:fld id="{62CCA688-0196-4668-938E-5AB69FE9DEDA}" type="datetimeFigureOut">
               <a:rPr lang="nb-NO" smtClean="0"/>
-              <a:t>05.05.2014</a:t>
+              <a:t>06.05.2014</a:t>
             </a:fld>
             <a:endParaRPr lang="nb-NO"/>
           </a:p>
@@ -4587,7 +4587,7 @@
           <a:p>
             <a:fld id="{62CCA688-0196-4668-938E-5AB69FE9DEDA}" type="datetimeFigureOut">
               <a:rPr lang="nb-NO" smtClean="0"/>
-              <a:t>05.05.2014</a:t>
+              <a:t>06.05.2014</a:t>
             </a:fld>
             <a:endParaRPr lang="nb-NO"/>
           </a:p>
@@ -6629,7 +6629,7 @@
 </file>
 
 <file path=ppt/slides/slide12.xml><?xml version="1.0" encoding="utf-8"?>
-<p:sld xmlns:a="http://schemas.openxmlformats.org/drawingml/2006/main" xmlns:r="http://schemas.openxmlformats.org/officeDocument/2006/relationships" xmlns:p="http://schemas.openxmlformats.org/presentationml/2006/main" show="0">
+<p:sld xmlns:a="http://schemas.openxmlformats.org/drawingml/2006/main" xmlns:r="http://schemas.openxmlformats.org/officeDocument/2006/relationships" xmlns:p="http://schemas.openxmlformats.org/presentationml/2006/main">
   <p:cSld>
     <p:spTree>
       <p:nvGrpSpPr>
@@ -6826,11 +6826,11 @@
   <p:clrMapOvr>
     <a:masterClrMapping/>
   </p:clrMapOvr>
-  <mc:AlternateContent xmlns:mc="http://schemas.openxmlformats.org/markup-compatibility/2006" xmlns:p14="http://schemas.microsoft.com/office/powerpoint/2010/main">
-    <mc:Choice Requires="p14">
+  <mc:AlternateContent xmlns:mc="http://schemas.openxmlformats.org/markup-compatibility/2006">
+    <mc:Choice xmlns:p14="http://schemas.microsoft.com/office/powerpoint/2010/main" Requires="p14">
       <p:transition spd="slow" p14:dur="2000"/>
     </mc:Choice>
-    <mc:Fallback xmlns="">
+    <mc:Fallback>
       <p:transition spd="slow"/>
     </mc:Fallback>
   </mc:AlternateContent>
@@ -6845,7 +6845,7 @@
 </file>
 
 <file path=ppt/slides/slide13.xml><?xml version="1.0" encoding="utf-8"?>
-<p:sld xmlns:a="http://schemas.openxmlformats.org/drawingml/2006/main" xmlns:r="http://schemas.openxmlformats.org/officeDocument/2006/relationships" xmlns:p="http://schemas.openxmlformats.org/presentationml/2006/main" show="0">
+<p:sld xmlns:a="http://schemas.openxmlformats.org/drawingml/2006/main" xmlns:r="http://schemas.openxmlformats.org/officeDocument/2006/relationships" xmlns:p="http://schemas.openxmlformats.org/presentationml/2006/main">
   <p:cSld>
     <p:spTree>
       <p:nvGrpSpPr>
@@ -7172,11 +7172,11 @@
   <p:clrMapOvr>
     <a:masterClrMapping/>
   </p:clrMapOvr>
-  <mc:AlternateContent xmlns:mc="http://schemas.openxmlformats.org/markup-compatibility/2006" xmlns:p14="http://schemas.microsoft.com/office/powerpoint/2010/main">
-    <mc:Choice Requires="p14">
+  <mc:AlternateContent xmlns:mc="http://schemas.openxmlformats.org/markup-compatibility/2006">
+    <mc:Choice xmlns:p14="http://schemas.microsoft.com/office/powerpoint/2010/main" Requires="p14">
       <p:transition spd="slow" p14:dur="2000"/>
     </mc:Choice>
-    <mc:Fallback xmlns="">
+    <mc:Fallback>
       <p:transition spd="slow"/>
     </mc:Fallback>
   </mc:AlternateContent>
@@ -7191,7 +7191,7 @@
 </file>
 
 <file path=ppt/slides/slide14.xml><?xml version="1.0" encoding="utf-8"?>
-<p:sld xmlns:a="http://schemas.openxmlformats.org/drawingml/2006/main" xmlns:r="http://schemas.openxmlformats.org/officeDocument/2006/relationships" xmlns:p="http://schemas.openxmlformats.org/presentationml/2006/main" showMasterSp="0" show="0">
+<p:sld xmlns:a="http://schemas.openxmlformats.org/drawingml/2006/main" xmlns:r="http://schemas.openxmlformats.org/officeDocument/2006/relationships" xmlns:p="http://schemas.openxmlformats.org/presentationml/2006/main" showMasterSp="0">
   <p:cSld>
     <p:spTree>
       <p:nvGrpSpPr>
@@ -7423,11 +7423,11 @@
   <p:clrMapOvr>
     <a:masterClrMapping/>
   </p:clrMapOvr>
-  <mc:AlternateContent xmlns:mc="http://schemas.openxmlformats.org/markup-compatibility/2006" xmlns:p14="http://schemas.microsoft.com/office/powerpoint/2010/main">
-    <mc:Choice Requires="p14">
+  <mc:AlternateContent xmlns:mc="http://schemas.openxmlformats.org/markup-compatibility/2006">
+    <mc:Choice xmlns:p14="http://schemas.microsoft.com/office/powerpoint/2010/main" Requires="p14">
       <p:transition spd="slow" p14:dur="2000"/>
     </mc:Choice>
-    <mc:Fallback xmlns="">
+    <mc:Fallback>
       <p:transition spd="slow"/>
     </mc:Fallback>
   </mc:AlternateContent>
@@ -7442,7 +7442,7 @@
 </file>
 
 <file path=ppt/slides/slide15.xml><?xml version="1.0" encoding="utf-8"?>
-<p:sld xmlns:a="http://schemas.openxmlformats.org/drawingml/2006/main" xmlns:r="http://schemas.openxmlformats.org/officeDocument/2006/relationships" xmlns:p="http://schemas.openxmlformats.org/presentationml/2006/main" show="0">
+<p:sld xmlns:a="http://schemas.openxmlformats.org/drawingml/2006/main" xmlns:r="http://schemas.openxmlformats.org/officeDocument/2006/relationships" xmlns:p="http://schemas.openxmlformats.org/presentationml/2006/main">
   <p:cSld>
     <p:spTree>
       <p:nvGrpSpPr>
@@ -7627,11 +7627,11 @@
   <p:clrMapOvr>
     <a:masterClrMapping/>
   </p:clrMapOvr>
-  <mc:AlternateContent xmlns:mc="http://schemas.openxmlformats.org/markup-compatibility/2006" xmlns:p14="http://schemas.microsoft.com/office/powerpoint/2010/main">
-    <mc:Choice Requires="p14">
+  <mc:AlternateContent xmlns:mc="http://schemas.openxmlformats.org/markup-compatibility/2006">
+    <mc:Choice xmlns:p14="http://schemas.microsoft.com/office/powerpoint/2010/main" Requires="p14">
       <p:transition spd="slow" p14:dur="2000"/>
     </mc:Choice>
-    <mc:Fallback xmlns="">
+    <mc:Fallback>
       <p:transition spd="slow"/>
     </mc:Fallback>
   </mc:AlternateContent>
@@ -7646,7 +7646,7 @@
 </file>
 
 <file path=ppt/slides/slide16.xml><?xml version="1.0" encoding="utf-8"?>
-<p:sld xmlns:a="http://schemas.openxmlformats.org/drawingml/2006/main" xmlns:r="http://schemas.openxmlformats.org/officeDocument/2006/relationships" xmlns:p="http://schemas.openxmlformats.org/presentationml/2006/main" showMasterSp="0" show="0">
+<p:sld xmlns:a="http://schemas.openxmlformats.org/drawingml/2006/main" xmlns:r="http://schemas.openxmlformats.org/officeDocument/2006/relationships" xmlns:p="http://schemas.openxmlformats.org/presentationml/2006/main" showMasterSp="0">
   <p:cSld>
     <p:spTree>
       <p:nvGrpSpPr>
@@ -7979,11 +7979,11 @@
   <p:clrMapOvr>
     <a:masterClrMapping/>
   </p:clrMapOvr>
-  <mc:AlternateContent xmlns:mc="http://schemas.openxmlformats.org/markup-compatibility/2006" xmlns:p14="http://schemas.microsoft.com/office/powerpoint/2010/main">
-    <mc:Choice Requires="p14">
+  <mc:AlternateContent xmlns:mc="http://schemas.openxmlformats.org/markup-compatibility/2006">
+    <mc:Choice xmlns:p14="http://schemas.microsoft.com/office/powerpoint/2010/main" Requires="p14">
       <p:transition spd="slow" p14:dur="2000"/>
     </mc:Choice>
-    <mc:Fallback xmlns="">
+    <mc:Fallback>
       <p:transition spd="slow"/>
     </mc:Fallback>
   </mc:AlternateContent>
@@ -7998,7 +7998,7 @@
 </file>
 
 <file path=ppt/slides/slide17.xml><?xml version="1.0" encoding="utf-8"?>
-<p:sld xmlns:a="http://schemas.openxmlformats.org/drawingml/2006/main" xmlns:r="http://schemas.openxmlformats.org/officeDocument/2006/relationships" xmlns:p="http://schemas.openxmlformats.org/presentationml/2006/main" showMasterSp="0" show="0">
+<p:sld xmlns:a="http://schemas.openxmlformats.org/drawingml/2006/main" xmlns:r="http://schemas.openxmlformats.org/officeDocument/2006/relationships" xmlns:p="http://schemas.openxmlformats.org/presentationml/2006/main" showMasterSp="0">
   <p:cSld>
     <p:spTree>
       <p:nvGrpSpPr>
@@ -8296,11 +8296,11 @@
   <p:clrMapOvr>
     <a:masterClrMapping/>
   </p:clrMapOvr>
-  <mc:AlternateContent xmlns:mc="http://schemas.openxmlformats.org/markup-compatibility/2006" xmlns:p14="http://schemas.microsoft.com/office/powerpoint/2010/main">
-    <mc:Choice Requires="p14">
+  <mc:AlternateContent xmlns:mc="http://schemas.openxmlformats.org/markup-compatibility/2006">
+    <mc:Choice xmlns:p14="http://schemas.microsoft.com/office/powerpoint/2010/main" Requires="p14">
       <p:transition spd="slow" p14:dur="2000"/>
     </mc:Choice>
-    <mc:Fallback xmlns="">
+    <mc:Fallback>
       <p:transition spd="slow"/>
     </mc:Fallback>
   </mc:AlternateContent>
@@ -8315,7 +8315,7 @@
 </file>
 
 <file path=ppt/slides/slide18.xml><?xml version="1.0" encoding="utf-8"?>
-<p:sld xmlns:a="http://schemas.openxmlformats.org/drawingml/2006/main" xmlns:r="http://schemas.openxmlformats.org/officeDocument/2006/relationships" xmlns:p="http://schemas.openxmlformats.org/presentationml/2006/main" showMasterSp="0" show="0">
+<p:sld xmlns:a="http://schemas.openxmlformats.org/drawingml/2006/main" xmlns:r="http://schemas.openxmlformats.org/officeDocument/2006/relationships" xmlns:p="http://schemas.openxmlformats.org/presentationml/2006/main" showMasterSp="0">
   <p:cSld>
     <p:spTree>
       <p:nvGrpSpPr>
@@ -8575,11 +8575,11 @@
   <p:clrMapOvr>
     <a:masterClrMapping/>
   </p:clrMapOvr>
-  <mc:AlternateContent xmlns:mc="http://schemas.openxmlformats.org/markup-compatibility/2006" xmlns:p14="http://schemas.microsoft.com/office/powerpoint/2010/main">
-    <mc:Choice Requires="p14">
+  <mc:AlternateContent xmlns:mc="http://schemas.openxmlformats.org/markup-compatibility/2006">
+    <mc:Choice xmlns:p14="http://schemas.microsoft.com/office/powerpoint/2010/main" Requires="p14">
       <p:transition spd="slow" p14:dur="2000"/>
     </mc:Choice>
-    <mc:Fallback xmlns="">
+    <mc:Fallback>
       <p:transition spd="slow"/>
     </mc:Fallback>
   </mc:AlternateContent>
@@ -8594,7 +8594,7 @@
 </file>
 
 <file path=ppt/slides/slide19.xml><?xml version="1.0" encoding="utf-8"?>
-<p:sld xmlns:a="http://schemas.openxmlformats.org/drawingml/2006/main" xmlns:r="http://schemas.openxmlformats.org/officeDocument/2006/relationships" xmlns:p="http://schemas.openxmlformats.org/presentationml/2006/main" showMasterSp="0" show="0">
+<p:sld xmlns:a="http://schemas.openxmlformats.org/drawingml/2006/main" xmlns:r="http://schemas.openxmlformats.org/officeDocument/2006/relationships" xmlns:p="http://schemas.openxmlformats.org/presentationml/2006/main" showMasterSp="0">
   <p:cSld>
     <p:spTree>
       <p:nvGrpSpPr>
@@ -8937,11 +8937,11 @@
   <p:clrMapOvr>
     <a:masterClrMapping/>
   </p:clrMapOvr>
-  <mc:AlternateContent xmlns:mc="http://schemas.openxmlformats.org/markup-compatibility/2006" xmlns:p14="http://schemas.microsoft.com/office/powerpoint/2010/main">
-    <mc:Choice Requires="p14">
+  <mc:AlternateContent xmlns:mc="http://schemas.openxmlformats.org/markup-compatibility/2006">
+    <mc:Choice xmlns:p14="http://schemas.microsoft.com/office/powerpoint/2010/main" Requires="p14">
       <p:transition spd="slow" p14:dur="2000"/>
     </mc:Choice>
-    <mc:Fallback xmlns="">
+    <mc:Fallback>
       <p:transition spd="slow"/>
     </mc:Fallback>
   </mc:AlternateContent>
@@ -14364,10 +14364,6 @@
               <a:rPr lang="nb-NO" dirty="0" smtClean="0"/>
               <a:t> </a:t>
             </a:r>
-            <a:r>
-              <a:rPr lang="nb-NO" dirty="0" smtClean="0"/>
-              <a:t/>
-            </a:r>
             <a:br>
               <a:rPr lang="nb-NO" dirty="0" smtClean="0"/>
             </a:br>
@@ -16883,7 +16879,6 @@
               <a:rPr lang="nb-NO" dirty="0" smtClean="0"/>
               <a:t> </a:t>
             </a:r>
-            <a:endParaRPr lang="nb-NO" dirty="0" smtClean="0"/>
           </a:p>
           <a:p>
             <a:pPr marL="502127" lvl="2" indent="0">
@@ -16941,11 +16936,7 @@
             </a:r>
             <a:r>
               <a:rPr lang="nb-NO" i="1" dirty="0" smtClean="0"/>
-              <a:t> </a:t>
-            </a:r>
-            <a:r>
-              <a:rPr lang="nb-NO" i="1" dirty="0" smtClean="0"/>
-              <a:t>  </a:t>
+              <a:t>   </a:t>
             </a:r>
             <a:r>
               <a:rPr lang="nb-NO" i="1" dirty="0" err="1" smtClean="0"/>
@@ -17760,7 +17751,7 @@
 </file>
 
 <file path=ppt/slides/slide40.xml><?xml version="1.0" encoding="utf-8"?>
-<p:sld xmlns:a="http://schemas.openxmlformats.org/drawingml/2006/main" xmlns:r="http://schemas.openxmlformats.org/officeDocument/2006/relationships" xmlns:p="http://schemas.openxmlformats.org/presentationml/2006/main" show="0">
+<p:sld xmlns:a="http://schemas.openxmlformats.org/drawingml/2006/main" xmlns:r="http://schemas.openxmlformats.org/officeDocument/2006/relationships" xmlns:p="http://schemas.openxmlformats.org/presentationml/2006/main">
   <p:cSld>
     <p:spTree>
       <p:nvGrpSpPr>
@@ -17793,11 +17784,7 @@
           <a:p>
             <a:r>
               <a:rPr lang="nb-NO" dirty="0" smtClean="0"/>
-              <a:t>Dat</a:t>
-            </a:r>
-            <a:r>
-              <a:rPr lang="nb-NO" dirty="0" smtClean="0"/>
-              <a:t>a </a:t>
+              <a:t>Data </a:t>
             </a:r>
             <a:r>
               <a:rPr lang="nb-NO" dirty="0" err="1" smtClean="0"/>
@@ -17968,11 +17955,15 @@
             </a:r>
             <a:r>
               <a:rPr lang="nb-NO" sz="2400" i="1" dirty="0" err="1" smtClean="0"/>
-              <a:t>agaiin</a:t>
+              <a:t>again</a:t>
             </a:r>
             <a:r>
               <a:rPr lang="nb-NO" sz="2400" i="1" dirty="0" smtClean="0"/>
-              <a:t> is used by </a:t>
+              <a:t> </a:t>
+            </a:r>
+            <a:r>
+              <a:rPr lang="nb-NO" sz="2400" i="1" dirty="0" smtClean="0"/>
+              <a:t>is used by </a:t>
             </a:r>
             <a:r>
               <a:rPr lang="nb-NO" sz="2400" i="1" dirty="0" err="1" smtClean="0"/>
@@ -18097,7 +18088,6 @@
               <a:rPr lang="nb-NO" sz="2000" dirty="0" smtClean="0"/>
               <a:t> </a:t>
             </a:r>
-            <a:endParaRPr lang="nb-NO" sz="2000" dirty="0" smtClean="0"/>
           </a:p>
         </p:txBody>
       </p:sp>
@@ -18216,11 +18206,7 @@
             </a:r>
             <a:r>
               <a:rPr lang="nb-NO" dirty="0" smtClean="0"/>
-              <a:t> </a:t>
-            </a:r>
-            <a:r>
-              <a:rPr lang="nb-NO" dirty="0" smtClean="0"/>
-              <a:t>happy </a:t>
+              <a:t> happy </a:t>
             </a:r>
             <a:r>
               <a:rPr lang="nb-NO" dirty="0" err="1" smtClean="0"/>
@@ -18228,11 +18214,7 @@
             </a:r>
             <a:r>
               <a:rPr lang="nb-NO" dirty="0" smtClean="0"/>
-              <a:t> a </a:t>
-            </a:r>
-            <a:r>
-              <a:rPr lang="nb-NO" dirty="0" smtClean="0"/>
-              <a:t>(</a:t>
+              <a:t> a (</a:t>
             </a:r>
             <a:r>
               <a:rPr lang="nb-NO" dirty="0" err="1" smtClean="0"/>
@@ -18315,15 +18297,7 @@
             </a:r>
             <a:r>
               <a:rPr lang="nb-NO" dirty="0" smtClean="0"/>
-              <a:t> </a:t>
-            </a:r>
-            <a:r>
-              <a:rPr lang="nb-NO" dirty="0" smtClean="0"/>
-              <a:t>be </a:t>
-            </a:r>
-            <a:r>
-              <a:rPr lang="nb-NO" dirty="0" smtClean="0"/>
-              <a:t>a </a:t>
+              <a:t> be a </a:t>
             </a:r>
             <a:r>
               <a:rPr lang="nb-NO" dirty="0" err="1" smtClean="0"/>
@@ -18349,7 +18323,6 @@
               <a:rPr lang="nb-NO" dirty="0" smtClean="0"/>
               <a:t> </a:t>
             </a:r>
-            <a:endParaRPr lang="nb-NO" dirty="0" smtClean="0"/>
           </a:p>
           <a:p>
             <a:pPr lvl="1"/>
@@ -18520,11 +18493,7 @@
             </a:r>
             <a:r>
               <a:rPr lang="nb-NO" dirty="0" smtClean="0"/>
-              <a:t> </a:t>
-            </a:r>
-            <a:r>
-              <a:rPr lang="nb-NO" dirty="0" smtClean="0"/>
-              <a:t>more </a:t>
+              <a:t> more </a:t>
             </a:r>
             <a:r>
               <a:rPr lang="nb-NO" dirty="0" err="1" smtClean="0"/>
@@ -19366,104 +19335,117 @@
         </p:nvSpPr>
         <p:spPr>
           <a:xfrm>
-            <a:off x="1331640" y="1052736"/>
-            <a:ext cx="7200800" cy="1656184"/>
+            <a:off x="1331640" y="404664"/>
+            <a:ext cx="7560840" cy="2304256"/>
           </a:xfrm>
         </p:spPr>
         <p:txBody>
           <a:bodyPr>
-            <a:normAutofit fontScale="90000"/>
+            <a:normAutofit/>
           </a:bodyPr>
           <a:lstStyle/>
           <a:p>
             <a:r>
-              <a:rPr lang="nb-NO" dirty="0" smtClean="0"/>
+              <a:rPr lang="nb-NO" sz="2400" dirty="0" smtClean="0"/>
               <a:t>Have </a:t>
             </a:r>
             <a:r>
-              <a:rPr lang="nb-NO" dirty="0" err="1" smtClean="0"/>
+              <a:rPr lang="nb-NO" sz="2400" dirty="0" err="1" smtClean="0"/>
               <a:t>fun</a:t>
             </a:r>
             <a:r>
-              <a:rPr lang="nb-NO" dirty="0"/>
+              <a:rPr lang="nb-NO" sz="2400" dirty="0"/>
               <a:t>!</a:t>
             </a:r>
             <a:r>
-              <a:rPr lang="nb-NO" dirty="0" smtClean="0"/>
+              <a:rPr lang="nb-NO" sz="2400" dirty="0" smtClean="0"/>
               <a:t> </a:t>
             </a:r>
             <a:br>
-              <a:rPr lang="nb-NO" dirty="0" smtClean="0"/>
+              <a:rPr lang="nb-NO" sz="2400" dirty="0" smtClean="0"/>
             </a:br>
             <a:r>
-              <a:rPr lang="nb-NO" dirty="0" smtClean="0"/>
+              <a:rPr lang="nb-NO" sz="2400" dirty="0" smtClean="0"/>
               <a:t/>
             </a:r>
             <a:br>
-              <a:rPr lang="nb-NO" dirty="0" smtClean="0"/>
+              <a:rPr lang="nb-NO" sz="2400" dirty="0" smtClean="0"/>
             </a:br>
             <a:r>
-              <a:rPr lang="nb-NO" dirty="0" smtClean="0">
+              <a:rPr lang="nb-NO" sz="2400" dirty="0" smtClean="0">
                 <a:hlinkClick r:id="rId2"/>
               </a:rPr>
-              <a:t>http://</a:t>
-            </a:r>
-            <a:r>
-              <a:rPr lang="nb-NO" dirty="0" smtClean="0">
-                <a:hlinkClick r:id="rId2"/>
-              </a:rPr>
-              <a:t>vegdata.no </a:t>
-            </a:r>
-            <a:r>
-              <a:rPr lang="nb-NO" dirty="0" smtClean="0"/>
+              <a:t>http://vegdata.no </a:t>
+            </a:r>
+            <a:r>
+              <a:rPr lang="nb-NO" sz="2400" dirty="0" smtClean="0"/>
               <a:t>		&lt;= </a:t>
             </a:r>
             <a:r>
-              <a:rPr lang="nb-NO" dirty="0" err="1" smtClean="0"/>
+              <a:rPr lang="nb-NO" sz="2400" dirty="0" err="1" smtClean="0"/>
               <a:t>our</a:t>
             </a:r>
             <a:r>
-              <a:rPr lang="nb-NO" dirty="0" smtClean="0"/>
-              <a:t> </a:t>
-            </a:r>
-            <a:r>
-              <a:rPr lang="nb-NO" dirty="0" err="1" smtClean="0"/>
+              <a:rPr lang="nb-NO" sz="2400" dirty="0" smtClean="0"/>
+              <a:t> </a:t>
+            </a:r>
+            <a:r>
+              <a:rPr lang="nb-NO" sz="2400" dirty="0" err="1" smtClean="0"/>
               <a:t>blog</a:t>
             </a:r>
             <a:r>
-              <a:rPr lang="nb-NO" dirty="0" smtClean="0"/>
+              <a:rPr lang="nb-NO" sz="2400" dirty="0" smtClean="0"/>
               <a:t/>
             </a:r>
             <a:br>
-              <a:rPr lang="nb-NO" dirty="0" smtClean="0"/>
+              <a:rPr lang="nb-NO" sz="2400" dirty="0" smtClean="0"/>
             </a:br>
             <a:r>
-              <a:rPr lang="nb-NO" dirty="0" smtClean="0">
+              <a:rPr lang="nb-NO" sz="2400" dirty="0" smtClean="0">
                 <a:hlinkClick r:id="rId3"/>
               </a:rPr>
               <a:t>http://labs.vegdata.no</a:t>
             </a:r>
             <a:r>
-              <a:rPr lang="nb-NO" dirty="0" smtClean="0"/>
+              <a:rPr lang="nb-NO" sz="2400" dirty="0" smtClean="0"/>
               <a:t>      &lt;= </a:t>
             </a:r>
             <a:r>
-              <a:rPr lang="nb-NO" dirty="0" err="1" smtClean="0"/>
+              <a:rPr lang="nb-NO" sz="2400" dirty="0" err="1" smtClean="0"/>
               <a:t>experimental</a:t>
             </a:r>
             <a:r>
-              <a:rPr lang="nb-NO" dirty="0" smtClean="0"/>
-              <a:t> </a:t>
-            </a:r>
-            <a:r>
-              <a:rPr lang="nb-NO" dirty="0" err="1" smtClean="0"/>
+              <a:rPr lang="nb-NO" sz="2400" dirty="0" smtClean="0"/>
+              <a:t> </a:t>
+            </a:r>
+            <a:r>
+              <a:rPr lang="nb-NO" sz="2400" dirty="0" err="1" smtClean="0"/>
               <a:t>stuff</a:t>
             </a:r>
             <a:r>
-              <a:rPr lang="nb-NO" dirty="0" smtClean="0"/>
-              <a:t> </a:t>
-            </a:r>
-            <a:endParaRPr lang="nb-NO" dirty="0"/>
+              <a:rPr lang="nb-NO" sz="2400" dirty="0"/>
+              <a:t/>
+            </a:r>
+            <a:br>
+              <a:rPr lang="nb-NO" sz="2400" dirty="0"/>
+            </a:br>
+            <a:r>
+              <a:rPr lang="nb-NO" sz="2400" dirty="0">
+                <a:hlinkClick r:id="rId4"/>
+              </a:rPr>
+              <a:t>https://</a:t>
+            </a:r>
+            <a:r>
+              <a:rPr lang="nb-NO" sz="2400" dirty="0" smtClean="0">
+                <a:hlinkClick r:id="rId4"/>
+              </a:rPr>
+              <a:t>github.com/LtGlahn/vegdatalabs_fme</a:t>
+            </a:r>
+            <a:r>
+              <a:rPr lang="nb-NO" sz="2400" dirty="0" smtClean="0"/>
+              <a:t>  </a:t>
+            </a:r>
+            <a:endParaRPr lang="nb-NO" sz="2400" dirty="0"/>
           </a:p>
         </p:txBody>
       </p:sp>
@@ -19476,7 +19458,7 @@
           <p:nvPr/>
         </p:nvPicPr>
         <p:blipFill>
-          <a:blip r:embed="rId4">
+          <a:blip r:embed="rId5">
             <a:extLst>
               <a:ext uri="{28A0092B-C50C-407E-A947-70E740481C1C}">
                 <a14:useLocalDpi xmlns:a14="http://schemas.microsoft.com/office/drawing/2010/main" val="0"/>
@@ -19593,7 +19575,6 @@
               <a:rPr lang="nb-NO" dirty="0"/>
               <a:t> </a:t>
             </a:r>
-            <a:endParaRPr lang="nb-NO" dirty="0"/>
           </a:p>
         </p:txBody>
       </p:sp>
@@ -19728,7 +19709,7 @@
         </p:nvSpPr>
         <p:spPr>
           <a:xfrm>
-            <a:off x="187050" y="4005064"/>
+            <a:off x="255289" y="3650222"/>
             <a:ext cx="8681923" cy="707886"/>
           </a:xfrm>
           <a:prstGeom prst="rect">
@@ -19839,6 +19820,48 @@
             <a:r>
               <a:rPr lang="nb-NO" dirty="0" smtClean="0"/>
               <a:t>: </a:t>
+            </a:r>
+            <a:endParaRPr lang="nb-NO" dirty="0"/>
+          </a:p>
+        </p:txBody>
+      </p:sp>
+      <p:sp>
+        <p:nvSpPr>
+          <p:cNvPr id="5" name="TextBox 4"/>
+          <p:cNvSpPr txBox="1"/>
+          <p:nvPr/>
+        </p:nvSpPr>
+        <p:spPr>
+          <a:xfrm>
+            <a:off x="831528" y="4878496"/>
+            <a:ext cx="5416868" cy="369332"/>
+          </a:xfrm>
+          <a:prstGeom prst="rect">
+            <a:avLst/>
+          </a:prstGeom>
+          <a:noFill/>
+        </p:spPr>
+        <p:txBody>
+          <a:bodyPr wrap="none" rtlCol="0">
+            <a:spAutoFit/>
+          </a:bodyPr>
+          <a:lstStyle/>
+          <a:p>
+            <a:r>
+              <a:rPr lang="nb-NO" dirty="0">
+                <a:hlinkClick r:id="rId7"/>
+              </a:rPr>
+              <a:t>https://</a:t>
+            </a:r>
+            <a:r>
+              <a:rPr lang="nb-NO" dirty="0" smtClean="0">
+                <a:hlinkClick r:id="rId7"/>
+              </a:rPr>
+              <a:t>github.com/LtGlahn/vegdatalabs_fme</a:t>
+            </a:r>
+            <a:r>
+              <a:rPr lang="nb-NO" dirty="0" smtClean="0"/>
+              <a:t> </a:t>
             </a:r>
             <a:endParaRPr lang="nb-NO" dirty="0"/>
           </a:p>
@@ -21141,7 +21164,7 @@
   <a:extraClrSchemeLst/>
   <a:extLst>
     <a:ext uri="{05A4C25C-085E-4340-85A3-A5531E510DB2}">
-      <thm15:themeFamily xmlns="" xmlns:thm15="http://schemas.microsoft.com/office/thememl/2012/main" name="1 Statens vegvesen liggende standard norsk.potx [Skrivebeskyttet]" id="{3E198112-B1E4-44BC-8C3E-1CA4DA7E830E}" vid="{29E3B4CA-6E79-4609-AB97-F34C0014226E}"/>
+      <thm15:themeFamily xmlns:thm15="http://schemas.microsoft.com/office/thememl/2012/main" xmlns="" name="1 Statens vegvesen liggende standard norsk.potx [Skrivebeskyttet]" id="{3E198112-B1E4-44BC-8C3E-1CA4DA7E830E}" vid="{29E3B4CA-6E79-4609-AB97-F34C0014226E}"/>
     </a:ext>
   </a:extLst>
 </a:theme>

</xml_diff>

<commit_message>
Fixed typo at slide 31 (Cirka 6.000 objects, not 60)
</commit_message>
<xml_diff>
--- a/nvdb2FME_jajens.pptx
+++ b/nvdb2FME_jajens.pptx
@@ -236,7 +236,7 @@
           <a:p>
             <a:fld id="{CF67E730-6CC1-4AA5-8873-2D45A47C3459}" type="datetimeFigureOut">
               <a:rPr lang="nb-NO" smtClean="0"/>
-              <a:t>06.05.2014</a:t>
+              <a:t>08.05.2014</a:t>
             </a:fld>
             <a:endParaRPr lang="nb-NO"/>
           </a:p>
@@ -1246,7 +1246,7 @@
           <a:p>
             <a:fld id="{62CCA688-0196-4668-938E-5AB69FE9DEDA}" type="datetimeFigureOut">
               <a:rPr lang="nb-NO" smtClean="0"/>
-              <a:t>06.05.2014</a:t>
+              <a:t>08.05.2014</a:t>
             </a:fld>
             <a:endParaRPr lang="nb-NO"/>
           </a:p>
@@ -1446,7 +1446,7 @@
           <a:p>
             <a:fld id="{62CCA688-0196-4668-938E-5AB69FE9DEDA}" type="datetimeFigureOut">
               <a:rPr lang="nb-NO" smtClean="0"/>
-              <a:t>06.05.2014</a:t>
+              <a:t>08.05.2014</a:t>
             </a:fld>
             <a:endParaRPr lang="nb-NO"/>
           </a:p>
@@ -1877,7 +1877,7 @@
           <a:p>
             <a:fld id="{62CCA688-0196-4668-938E-5AB69FE9DEDA}" type="datetimeFigureOut">
               <a:rPr lang="nb-NO" smtClean="0"/>
-              <a:t>06.05.2014</a:t>
+              <a:t>08.05.2014</a:t>
             </a:fld>
             <a:endParaRPr lang="nb-NO"/>
           </a:p>
@@ -2213,7 +2213,7 @@
           <a:p>
             <a:fld id="{62CCA688-0196-4668-938E-5AB69FE9DEDA}" type="datetimeFigureOut">
               <a:rPr lang="nb-NO" smtClean="0"/>
-              <a:t>06.05.2014</a:t>
+              <a:t>08.05.2014</a:t>
             </a:fld>
             <a:endParaRPr lang="nb-NO"/>
           </a:p>
@@ -2749,7 +2749,7 @@
           <a:p>
             <a:fld id="{62CCA688-0196-4668-938E-5AB69FE9DEDA}" type="datetimeFigureOut">
               <a:rPr lang="nb-NO" smtClean="0"/>
-              <a:t>06.05.2014</a:t>
+              <a:t>08.05.2014</a:t>
             </a:fld>
             <a:endParaRPr lang="nb-NO"/>
           </a:p>
@@ -3039,7 +3039,7 @@
           <a:p>
             <a:fld id="{62CCA688-0196-4668-938E-5AB69FE9DEDA}" type="datetimeFigureOut">
               <a:rPr lang="nb-NO" smtClean="0"/>
-              <a:t>06.05.2014</a:t>
+              <a:t>08.05.2014</a:t>
             </a:fld>
             <a:endParaRPr lang="nb-NO"/>
           </a:p>
@@ -3423,7 +3423,7 @@
           <a:p>
             <a:fld id="{62CCA688-0196-4668-938E-5AB69FE9DEDA}" type="datetimeFigureOut">
               <a:rPr lang="nb-NO" smtClean="0"/>
-              <a:t>06.05.2014</a:t>
+              <a:t>08.05.2014</a:t>
             </a:fld>
             <a:endParaRPr lang="nb-NO"/>
           </a:p>
@@ -3788,7 +3788,7 @@
           <a:p>
             <a:fld id="{62CCA688-0196-4668-938E-5AB69FE9DEDA}" type="datetimeFigureOut">
               <a:rPr lang="nb-NO" smtClean="0"/>
-              <a:t>06.05.2014</a:t>
+              <a:t>08.05.2014</a:t>
             </a:fld>
             <a:endParaRPr lang="nb-NO"/>
           </a:p>
@@ -4088,7 +4088,7 @@
           <a:p>
             <a:fld id="{62CCA688-0196-4668-938E-5AB69FE9DEDA}" type="datetimeFigureOut">
               <a:rPr lang="nb-NO" smtClean="0"/>
-              <a:t>06.05.2014</a:t>
+              <a:t>08.05.2014</a:t>
             </a:fld>
             <a:endParaRPr lang="nb-NO"/>
           </a:p>
@@ -4331,7 +4331,7 @@
           <a:p>
             <a:fld id="{62CCA688-0196-4668-938E-5AB69FE9DEDA}" type="datetimeFigureOut">
               <a:rPr lang="nb-NO" smtClean="0"/>
-              <a:t>06.05.2014</a:t>
+              <a:t>08.05.2014</a:t>
             </a:fld>
             <a:endParaRPr lang="nb-NO"/>
           </a:p>
@@ -4587,7 +4587,7 @@
           <a:p>
             <a:fld id="{62CCA688-0196-4668-938E-5AB69FE9DEDA}" type="datetimeFigureOut">
               <a:rPr lang="nb-NO" smtClean="0"/>
-              <a:t>06.05.2014</a:t>
+              <a:t>08.05.2014</a:t>
             </a:fld>
             <a:endParaRPr lang="nb-NO"/>
           </a:p>
@@ -6826,11 +6826,11 @@
   <p:clrMapOvr>
     <a:masterClrMapping/>
   </p:clrMapOvr>
-  <mc:AlternateContent xmlns:mc="http://schemas.openxmlformats.org/markup-compatibility/2006">
-    <mc:Choice xmlns:p14="http://schemas.microsoft.com/office/powerpoint/2010/main" Requires="p14">
+  <mc:AlternateContent xmlns:mc="http://schemas.openxmlformats.org/markup-compatibility/2006" xmlns:p14="http://schemas.microsoft.com/office/powerpoint/2010/main">
+    <mc:Choice Requires="p14">
       <p:transition spd="slow" p14:dur="2000"/>
     </mc:Choice>
-    <mc:Fallback>
+    <mc:Fallback xmlns="">
       <p:transition spd="slow"/>
     </mc:Fallback>
   </mc:AlternateContent>
@@ -7172,11 +7172,11 @@
   <p:clrMapOvr>
     <a:masterClrMapping/>
   </p:clrMapOvr>
-  <mc:AlternateContent xmlns:mc="http://schemas.openxmlformats.org/markup-compatibility/2006">
-    <mc:Choice xmlns:p14="http://schemas.microsoft.com/office/powerpoint/2010/main" Requires="p14">
+  <mc:AlternateContent xmlns:mc="http://schemas.openxmlformats.org/markup-compatibility/2006" xmlns:p14="http://schemas.microsoft.com/office/powerpoint/2010/main">
+    <mc:Choice Requires="p14">
       <p:transition spd="slow" p14:dur="2000"/>
     </mc:Choice>
-    <mc:Fallback>
+    <mc:Fallback xmlns="">
       <p:transition spd="slow"/>
     </mc:Fallback>
   </mc:AlternateContent>
@@ -7423,11 +7423,11 @@
   <p:clrMapOvr>
     <a:masterClrMapping/>
   </p:clrMapOvr>
-  <mc:AlternateContent xmlns:mc="http://schemas.openxmlformats.org/markup-compatibility/2006">
-    <mc:Choice xmlns:p14="http://schemas.microsoft.com/office/powerpoint/2010/main" Requires="p14">
+  <mc:AlternateContent xmlns:mc="http://schemas.openxmlformats.org/markup-compatibility/2006" xmlns:p14="http://schemas.microsoft.com/office/powerpoint/2010/main">
+    <mc:Choice Requires="p14">
       <p:transition spd="slow" p14:dur="2000"/>
     </mc:Choice>
-    <mc:Fallback>
+    <mc:Fallback xmlns="">
       <p:transition spd="slow"/>
     </mc:Fallback>
   </mc:AlternateContent>
@@ -7627,11 +7627,11 @@
   <p:clrMapOvr>
     <a:masterClrMapping/>
   </p:clrMapOvr>
-  <mc:AlternateContent xmlns:mc="http://schemas.openxmlformats.org/markup-compatibility/2006">
-    <mc:Choice xmlns:p14="http://schemas.microsoft.com/office/powerpoint/2010/main" Requires="p14">
+  <mc:AlternateContent xmlns:mc="http://schemas.openxmlformats.org/markup-compatibility/2006" xmlns:p14="http://schemas.microsoft.com/office/powerpoint/2010/main">
+    <mc:Choice Requires="p14">
       <p:transition spd="slow" p14:dur="2000"/>
     </mc:Choice>
-    <mc:Fallback>
+    <mc:Fallback xmlns="">
       <p:transition spd="slow"/>
     </mc:Fallback>
   </mc:AlternateContent>
@@ -7979,11 +7979,11 @@
   <p:clrMapOvr>
     <a:masterClrMapping/>
   </p:clrMapOvr>
-  <mc:AlternateContent xmlns:mc="http://schemas.openxmlformats.org/markup-compatibility/2006">
-    <mc:Choice xmlns:p14="http://schemas.microsoft.com/office/powerpoint/2010/main" Requires="p14">
+  <mc:AlternateContent xmlns:mc="http://schemas.openxmlformats.org/markup-compatibility/2006" xmlns:p14="http://schemas.microsoft.com/office/powerpoint/2010/main">
+    <mc:Choice Requires="p14">
       <p:transition spd="slow" p14:dur="2000"/>
     </mc:Choice>
-    <mc:Fallback>
+    <mc:Fallback xmlns="">
       <p:transition spd="slow"/>
     </mc:Fallback>
   </mc:AlternateContent>
@@ -8296,11 +8296,11 @@
   <p:clrMapOvr>
     <a:masterClrMapping/>
   </p:clrMapOvr>
-  <mc:AlternateContent xmlns:mc="http://schemas.openxmlformats.org/markup-compatibility/2006">
-    <mc:Choice xmlns:p14="http://schemas.microsoft.com/office/powerpoint/2010/main" Requires="p14">
+  <mc:AlternateContent xmlns:mc="http://schemas.openxmlformats.org/markup-compatibility/2006" xmlns:p14="http://schemas.microsoft.com/office/powerpoint/2010/main">
+    <mc:Choice Requires="p14">
       <p:transition spd="slow" p14:dur="2000"/>
     </mc:Choice>
-    <mc:Fallback>
+    <mc:Fallback xmlns="">
       <p:transition spd="slow"/>
     </mc:Fallback>
   </mc:AlternateContent>
@@ -8575,11 +8575,11 @@
   <p:clrMapOvr>
     <a:masterClrMapping/>
   </p:clrMapOvr>
-  <mc:AlternateContent xmlns:mc="http://schemas.openxmlformats.org/markup-compatibility/2006">
-    <mc:Choice xmlns:p14="http://schemas.microsoft.com/office/powerpoint/2010/main" Requires="p14">
+  <mc:AlternateContent xmlns:mc="http://schemas.openxmlformats.org/markup-compatibility/2006" xmlns:p14="http://schemas.microsoft.com/office/powerpoint/2010/main">
+    <mc:Choice Requires="p14">
       <p:transition spd="slow" p14:dur="2000"/>
     </mc:Choice>
-    <mc:Fallback>
+    <mc:Fallback xmlns="">
       <p:transition spd="slow"/>
     </mc:Fallback>
   </mc:AlternateContent>
@@ -8937,11 +8937,11 @@
   <p:clrMapOvr>
     <a:masterClrMapping/>
   </p:clrMapOvr>
-  <mc:AlternateContent xmlns:mc="http://schemas.openxmlformats.org/markup-compatibility/2006">
-    <mc:Choice xmlns:p14="http://schemas.microsoft.com/office/powerpoint/2010/main" Requires="p14">
+  <mc:AlternateContent xmlns:mc="http://schemas.openxmlformats.org/markup-compatibility/2006" xmlns:p14="http://schemas.microsoft.com/office/powerpoint/2010/main">
+    <mc:Choice Requires="p14">
       <p:transition spd="slow" p14:dur="2000"/>
     </mc:Choice>
-    <mc:Fallback>
+    <mc:Fallback xmlns="">
       <p:transition spd="slow"/>
     </mc:Fallback>
   </mc:AlternateContent>
@@ -14549,7 +14549,7 @@
         <p:spPr>
           <a:xfrm>
             <a:off x="4644008" y="4797152"/>
-            <a:ext cx="2916183" cy="369332"/>
+            <a:ext cx="3207929" cy="369332"/>
           </a:xfrm>
           <a:prstGeom prst="rect">
             <a:avLst/>
@@ -14564,7 +14564,11 @@
           <a:p>
             <a:r>
               <a:rPr lang="nb-NO" dirty="0" smtClean="0"/>
-              <a:t>~60 </a:t>
+              <a:t>~</a:t>
+            </a:r>
+            <a:r>
+              <a:rPr lang="nb-NO" dirty="0" smtClean="0"/>
+              <a:t>6000 </a:t>
             </a:r>
             <a:r>
               <a:rPr lang="nb-NO" dirty="0" err="1" smtClean="0"/>
@@ -17959,11 +17963,7 @@
             </a:r>
             <a:r>
               <a:rPr lang="nb-NO" sz="2400" i="1" dirty="0" smtClean="0"/>
-              <a:t> </a:t>
-            </a:r>
-            <a:r>
-              <a:rPr lang="nb-NO" sz="2400" i="1" dirty="0" smtClean="0"/>
-              <a:t>is used by </a:t>
+              <a:t> is used by </a:t>
             </a:r>
             <a:r>
               <a:rPr lang="nb-NO" sz="2400" i="1" dirty="0" err="1" smtClean="0"/>
@@ -18101,11 +18101,11 @@
   <p:clrMapOvr>
     <a:masterClrMapping/>
   </p:clrMapOvr>
-  <mc:AlternateContent xmlns:mc="http://schemas.openxmlformats.org/markup-compatibility/2006">
-    <mc:Choice xmlns:p14="http://schemas.microsoft.com/office/powerpoint/2010/main" Requires="p14">
+  <mc:AlternateContent xmlns:mc="http://schemas.openxmlformats.org/markup-compatibility/2006" xmlns:p14="http://schemas.microsoft.com/office/powerpoint/2010/main">
+    <mc:Choice Requires="p14">
       <p:transition spd="slow" p14:dur="2000"/>
     </mc:Choice>
-    <mc:Fallback>
+    <mc:Fallback xmlns="">
       <p:transition spd="slow"/>
     </mc:Fallback>
   </mc:AlternateContent>
@@ -21164,7 +21164,7 @@
   <a:extraClrSchemeLst/>
   <a:extLst>
     <a:ext uri="{05A4C25C-085E-4340-85A3-A5531E510DB2}">
-      <thm15:themeFamily xmlns:thm15="http://schemas.microsoft.com/office/thememl/2012/main" xmlns="" name="1 Statens vegvesen liggende standard norsk.potx [Skrivebeskyttet]" id="{3E198112-B1E4-44BC-8C3E-1CA4DA7E830E}" vid="{29E3B4CA-6E79-4609-AB97-F34C0014226E}"/>
+      <thm15:themeFamily xmlns="" xmlns:thm15="http://schemas.microsoft.com/office/thememl/2012/main" name="1 Statens vegvesen liggende standard norsk.potx [Skrivebeskyttet]" id="{3E198112-B1E4-44BC-8C3E-1CA4DA7E830E}" vid="{29E3B4CA-6E79-4609-AB97-F34C0014226E}"/>
     </a:ext>
   </a:extLst>
 </a:theme>

</xml_diff>